<commit_message>
Added review and feedback
</commit_message>
<xml_diff>
--- a/Диплом/Розробка застосунку Месенджер.pptx
+++ b/Диплом/Розробка застосунку Месенджер.pptx
@@ -7,16 +7,15 @@
   <p:sldIdLst>
     <p:sldId id="256" r:id="rId2"/>
     <p:sldId id="257" r:id="rId3"/>
-    <p:sldId id="258" r:id="rId4"/>
-    <p:sldId id="259" r:id="rId5"/>
-    <p:sldId id="260" r:id="rId6"/>
-    <p:sldId id="261" r:id="rId7"/>
-    <p:sldId id="262" r:id="rId8"/>
-    <p:sldId id="263" r:id="rId9"/>
+    <p:sldId id="268" r:id="rId4"/>
+    <p:sldId id="260" r:id="rId5"/>
+    <p:sldId id="263" r:id="rId6"/>
+    <p:sldId id="269" r:id="rId7"/>
+    <p:sldId id="270" r:id="rId8"/>
+    <p:sldId id="271" r:id="rId9"/>
     <p:sldId id="264" r:id="rId10"/>
     <p:sldId id="267" r:id="rId11"/>
     <p:sldId id="265" r:id="rId12"/>
-    <p:sldId id="266" r:id="rId13"/>
   </p:sldIdLst>
   <p:sldSz cx="9144000" cy="6858000" type="screen4x3"/>
   <p:notesSz cx="6858000" cy="9144000"/>
@@ -115,6 +114,22 @@
       </a:defRPr>
     </a:lvl9pPr>
   </p:defaultTextStyle>
+  <p:extLst>
+    <p:ext uri="{EFAFB233-063F-42B5-8137-9DF3F51BA10A}">
+      <p15:sldGuideLst xmlns:p15="http://schemas.microsoft.com/office/powerpoint/2012/main">
+        <p15:guide id="1" orient="horz" pos="2160">
+          <p15:clr>
+            <a:srgbClr val="A4A3A4"/>
+          </p15:clr>
+        </p15:guide>
+        <p15:guide id="2" pos="2880">
+          <p15:clr>
+            <a:srgbClr val="A4A3A4"/>
+          </p15:clr>
+        </p15:guide>
+      </p15:sldGuideLst>
+    </p:ext>
+  </p:extLst>
 </p:presentation>
 </file>
 
@@ -165,7 +180,7 @@
           </a:lstStyle>
           <a:p>
             <a:r>
-              <a:rPr lang="ru-RU" smtClean="0"/>
+              <a:rPr lang="ru-RU"/>
               <a:t>Образец заголовка</a:t>
             </a:r>
             <a:endParaRPr lang="en-US" dirty="0"/>
@@ -286,7 +301,7 @@
           </a:lstStyle>
           <a:p>
             <a:r>
-              <a:rPr lang="ru-RU" smtClean="0"/>
+              <a:rPr lang="ru-RU"/>
               <a:t>Образец подзаголовка</a:t>
             </a:r>
             <a:endParaRPr lang="en-US" dirty="0"/>
@@ -310,7 +325,7 @@
           <a:p>
             <a:fld id="{F38A05D3-C833-4822-B942-54F127E20656}" type="datetimeFigureOut">
               <a:rPr lang="ru-RU" smtClean="0"/>
-              <a:t>19.05.2019</a:t>
+              <a:t>30.05.2019</a:t>
             </a:fld>
             <a:endParaRPr lang="ru-RU"/>
           </a:p>
@@ -399,7 +414,7 @@
           <a:lstStyle/>
           <a:p>
             <a:r>
-              <a:rPr lang="ru-RU" smtClean="0"/>
+              <a:rPr lang="ru-RU"/>
               <a:t>Образец заголовка</a:t>
             </a:r>
             <a:endParaRPr lang="en-US" dirty="0"/>
@@ -423,35 +438,35 @@
           <a:p>
             <a:pPr lvl="0"/>
             <a:r>
-              <a:rPr lang="ru-RU" smtClean="0"/>
+              <a:rPr lang="ru-RU"/>
               <a:t>Образец текста</a:t>
             </a:r>
           </a:p>
           <a:p>
             <a:pPr lvl="1"/>
             <a:r>
-              <a:rPr lang="ru-RU" smtClean="0"/>
+              <a:rPr lang="ru-RU"/>
               <a:t>Второй уровень</a:t>
             </a:r>
           </a:p>
           <a:p>
             <a:pPr lvl="2"/>
             <a:r>
-              <a:rPr lang="ru-RU" smtClean="0"/>
+              <a:rPr lang="ru-RU"/>
               <a:t>Третий уровень</a:t>
             </a:r>
           </a:p>
           <a:p>
             <a:pPr lvl="3"/>
             <a:r>
-              <a:rPr lang="ru-RU" smtClean="0"/>
+              <a:rPr lang="ru-RU"/>
               <a:t>Четвертый уровень</a:t>
             </a:r>
           </a:p>
           <a:p>
             <a:pPr lvl="4"/>
             <a:r>
-              <a:rPr lang="ru-RU" smtClean="0"/>
+              <a:rPr lang="ru-RU"/>
               <a:t>Пятый уровень</a:t>
             </a:r>
             <a:endParaRPr lang="en-US"/>
@@ -475,7 +490,7 @@
           <a:p>
             <a:fld id="{F38A05D3-C833-4822-B942-54F127E20656}" type="datetimeFigureOut">
               <a:rPr lang="ru-RU" smtClean="0"/>
-              <a:t>19.05.2019</a:t>
+              <a:t>30.05.2019</a:t>
             </a:fld>
             <a:endParaRPr lang="ru-RU"/>
           </a:p>
@@ -569,7 +584,7 @@
           <a:lstStyle/>
           <a:p>
             <a:r>
-              <a:rPr lang="ru-RU" smtClean="0"/>
+              <a:rPr lang="ru-RU"/>
               <a:t>Образец заголовка</a:t>
             </a:r>
             <a:endParaRPr lang="en-US" dirty="0"/>
@@ -598,35 +613,35 @@
           <a:p>
             <a:pPr lvl="0"/>
             <a:r>
-              <a:rPr lang="ru-RU" smtClean="0"/>
+              <a:rPr lang="ru-RU"/>
               <a:t>Образец текста</a:t>
             </a:r>
           </a:p>
           <a:p>
             <a:pPr lvl="1"/>
             <a:r>
-              <a:rPr lang="ru-RU" smtClean="0"/>
+              <a:rPr lang="ru-RU"/>
               <a:t>Второй уровень</a:t>
             </a:r>
           </a:p>
           <a:p>
             <a:pPr lvl="2"/>
             <a:r>
-              <a:rPr lang="ru-RU" smtClean="0"/>
+              <a:rPr lang="ru-RU"/>
               <a:t>Третий уровень</a:t>
             </a:r>
           </a:p>
           <a:p>
             <a:pPr lvl="3"/>
             <a:r>
-              <a:rPr lang="ru-RU" smtClean="0"/>
+              <a:rPr lang="ru-RU"/>
               <a:t>Четвертый уровень</a:t>
             </a:r>
           </a:p>
           <a:p>
             <a:pPr lvl="4"/>
             <a:r>
-              <a:rPr lang="ru-RU" smtClean="0"/>
+              <a:rPr lang="ru-RU"/>
               <a:t>Пятый уровень</a:t>
             </a:r>
             <a:endParaRPr lang="en-US"/>
@@ -650,7 +665,7 @@
           <a:p>
             <a:fld id="{F38A05D3-C833-4822-B942-54F127E20656}" type="datetimeFigureOut">
               <a:rPr lang="ru-RU" smtClean="0"/>
-              <a:t>19.05.2019</a:t>
+              <a:t>30.05.2019</a:t>
             </a:fld>
             <a:endParaRPr lang="ru-RU"/>
           </a:p>
@@ -739,7 +754,7 @@
           <a:lstStyle/>
           <a:p>
             <a:r>
-              <a:rPr lang="ru-RU" smtClean="0"/>
+              <a:rPr lang="ru-RU"/>
               <a:t>Образец заголовка</a:t>
             </a:r>
             <a:endParaRPr lang="en-US" dirty="0"/>
@@ -781,38 +796,38 @@
           <a:p>
             <a:pPr lvl="0"/>
             <a:r>
-              <a:rPr lang="ru-RU" smtClean="0"/>
+              <a:rPr lang="ru-RU"/>
               <a:t>Образец текста</a:t>
             </a:r>
           </a:p>
           <a:p>
             <a:pPr lvl="1"/>
             <a:r>
-              <a:rPr lang="ru-RU" smtClean="0"/>
+              <a:rPr lang="ru-RU"/>
               <a:t>Второй уровень</a:t>
             </a:r>
           </a:p>
           <a:p>
             <a:pPr lvl="2"/>
             <a:r>
-              <a:rPr lang="ru-RU" smtClean="0"/>
+              <a:rPr lang="ru-RU"/>
               <a:t>Третий уровень</a:t>
             </a:r>
           </a:p>
           <a:p>
             <a:pPr lvl="3"/>
             <a:r>
-              <a:rPr lang="ru-RU" smtClean="0"/>
+              <a:rPr lang="ru-RU"/>
               <a:t>Четвертый уровень</a:t>
             </a:r>
           </a:p>
           <a:p>
             <a:pPr lvl="4"/>
             <a:r>
-              <a:rPr lang="ru-RU" smtClean="0"/>
+              <a:rPr lang="ru-RU"/>
               <a:t>Пятый уровень</a:t>
             </a:r>
-            <a:endParaRPr lang="en-US" dirty="0" smtClean="0"/>
+            <a:endParaRPr lang="en-US" dirty="0"/>
           </a:p>
         </p:txBody>
       </p:sp>
@@ -833,7 +848,7 @@
           <a:p>
             <a:fld id="{F38A05D3-C833-4822-B942-54F127E20656}" type="datetimeFigureOut">
               <a:rPr lang="ru-RU" smtClean="0"/>
-              <a:t>19.05.2019</a:t>
+              <a:t>30.05.2019</a:t>
             </a:fld>
             <a:endParaRPr lang="ru-RU"/>
           </a:p>
@@ -952,7 +967,7 @@
           </a:lstStyle>
           <a:p>
             <a:r>
-              <a:rPr lang="ru-RU" smtClean="0"/>
+              <a:rPr lang="ru-RU"/>
               <a:t>Образец заголовка</a:t>
             </a:r>
             <a:endParaRPr lang="en-US" dirty="0"/>
@@ -1072,7 +1087,7 @@
           <a:p>
             <a:pPr lvl="0"/>
             <a:r>
-              <a:rPr lang="ru-RU" smtClean="0"/>
+              <a:rPr lang="ru-RU"/>
               <a:t>Образец текста</a:t>
             </a:r>
           </a:p>
@@ -1095,7 +1110,7 @@
           <a:p>
             <a:fld id="{F38A05D3-C833-4822-B942-54F127E20656}" type="datetimeFigureOut">
               <a:rPr lang="ru-RU" smtClean="0"/>
-              <a:t>19.05.2019</a:t>
+              <a:t>30.05.2019</a:t>
             </a:fld>
             <a:endParaRPr lang="ru-RU"/>
           </a:p>
@@ -1334,7 +1349,7 @@
           <a:lstStyle/>
           <a:p>
             <a:r>
-              <a:rPr lang="ru-RU" smtClean="0"/>
+              <a:rPr lang="ru-RU"/>
               <a:t>Образец заголовка</a:t>
             </a:r>
             <a:endParaRPr lang="en-US"/>
@@ -1391,38 +1406,38 @@
           <a:p>
             <a:pPr lvl="0"/>
             <a:r>
-              <a:rPr lang="ru-RU" smtClean="0"/>
+              <a:rPr lang="ru-RU"/>
               <a:t>Образец текста</a:t>
             </a:r>
           </a:p>
           <a:p>
             <a:pPr lvl="1"/>
             <a:r>
-              <a:rPr lang="ru-RU" smtClean="0"/>
+              <a:rPr lang="ru-RU"/>
               <a:t>Второй уровень</a:t>
             </a:r>
           </a:p>
           <a:p>
             <a:pPr lvl="2"/>
             <a:r>
-              <a:rPr lang="ru-RU" smtClean="0"/>
+              <a:rPr lang="ru-RU"/>
               <a:t>Третий уровень</a:t>
             </a:r>
           </a:p>
           <a:p>
             <a:pPr lvl="3"/>
             <a:r>
-              <a:rPr lang="ru-RU" smtClean="0"/>
+              <a:rPr lang="ru-RU"/>
               <a:t>Четвертый уровень</a:t>
             </a:r>
           </a:p>
           <a:p>
             <a:pPr lvl="4"/>
             <a:r>
-              <a:rPr lang="ru-RU" smtClean="0"/>
+              <a:rPr lang="ru-RU"/>
               <a:t>Пятый уровень</a:t>
             </a:r>
-            <a:endParaRPr lang="en-US" dirty="0" smtClean="0"/>
+            <a:endParaRPr lang="en-US" dirty="0"/>
           </a:p>
         </p:txBody>
       </p:sp>
@@ -1443,7 +1458,7 @@
           <a:p>
             <a:fld id="{F38A05D3-C833-4822-B942-54F127E20656}" type="datetimeFigureOut">
               <a:rPr lang="ru-RU" smtClean="0"/>
-              <a:t>19.05.2019</a:t>
+              <a:t>30.05.2019</a:t>
             </a:fld>
             <a:endParaRPr lang="ru-RU"/>
           </a:p>
@@ -1513,35 +1528,35 @@
           <a:p>
             <a:pPr lvl="0"/>
             <a:r>
-              <a:rPr lang="ru-RU" smtClean="0"/>
+              <a:rPr lang="ru-RU"/>
               <a:t>Образец текста</a:t>
             </a:r>
           </a:p>
           <a:p>
             <a:pPr lvl="1"/>
             <a:r>
-              <a:rPr lang="ru-RU" smtClean="0"/>
+              <a:rPr lang="ru-RU"/>
               <a:t>Второй уровень</a:t>
             </a:r>
           </a:p>
           <a:p>
             <a:pPr lvl="2"/>
             <a:r>
-              <a:rPr lang="ru-RU" smtClean="0"/>
+              <a:rPr lang="ru-RU"/>
               <a:t>Третий уровень</a:t>
             </a:r>
           </a:p>
           <a:p>
             <a:pPr lvl="3"/>
             <a:r>
-              <a:rPr lang="ru-RU" smtClean="0"/>
+              <a:rPr lang="ru-RU"/>
               <a:t>Четвертый уровень</a:t>
             </a:r>
           </a:p>
           <a:p>
             <a:pPr lvl="4"/>
             <a:r>
-              <a:rPr lang="ru-RU" smtClean="0"/>
+              <a:rPr lang="ru-RU"/>
               <a:t>Пятый уровень</a:t>
             </a:r>
             <a:endParaRPr lang="en-US"/>
@@ -1593,7 +1608,7 @@
           </a:lstStyle>
           <a:p>
             <a:r>
-              <a:rPr lang="ru-RU" smtClean="0"/>
+              <a:rPr lang="ru-RU"/>
               <a:t>Образец заголовка</a:t>
             </a:r>
             <a:endParaRPr lang="en-US"/>
@@ -1661,7 +1676,7 @@
           <a:p>
             <a:pPr lvl="0"/>
             <a:r>
-              <a:rPr lang="ru-RU" smtClean="0"/>
+              <a:rPr lang="ru-RU"/>
               <a:t>Образец текста</a:t>
             </a:r>
           </a:p>
@@ -1728,7 +1743,7 @@
           <a:p>
             <a:pPr lvl="0"/>
             <a:r>
-              <a:rPr lang="ru-RU" smtClean="0"/>
+              <a:rPr lang="ru-RU"/>
               <a:t>Образец текста</a:t>
             </a:r>
           </a:p>
@@ -1751,7 +1766,7 @@
           <a:p>
             <a:fld id="{F38A05D3-C833-4822-B942-54F127E20656}" type="datetimeFigureOut">
               <a:rPr lang="ru-RU" smtClean="0"/>
-              <a:t>19.05.2019</a:t>
+              <a:t>30.05.2019</a:t>
             </a:fld>
             <a:endParaRPr lang="ru-RU"/>
           </a:p>
@@ -1821,35 +1836,35 @@
           <a:p>
             <a:pPr lvl="0"/>
             <a:r>
-              <a:rPr lang="ru-RU" smtClean="0"/>
+              <a:rPr lang="ru-RU"/>
               <a:t>Образец текста</a:t>
             </a:r>
           </a:p>
           <a:p>
             <a:pPr lvl="1"/>
             <a:r>
-              <a:rPr lang="ru-RU" smtClean="0"/>
+              <a:rPr lang="ru-RU"/>
               <a:t>Второй уровень</a:t>
             </a:r>
           </a:p>
           <a:p>
             <a:pPr lvl="2"/>
             <a:r>
-              <a:rPr lang="ru-RU" smtClean="0"/>
+              <a:rPr lang="ru-RU"/>
               <a:t>Третий уровень</a:t>
             </a:r>
           </a:p>
           <a:p>
             <a:pPr lvl="3"/>
             <a:r>
-              <a:rPr lang="ru-RU" smtClean="0"/>
+              <a:rPr lang="ru-RU"/>
               <a:t>Четвертый уровень</a:t>
             </a:r>
           </a:p>
           <a:p>
             <a:pPr lvl="4"/>
             <a:r>
-              <a:rPr lang="ru-RU" smtClean="0"/>
+              <a:rPr lang="ru-RU"/>
               <a:t>Пятый уровень</a:t>
             </a:r>
             <a:endParaRPr lang="en-US" dirty="0"/>
@@ -1878,35 +1893,35 @@
           <a:p>
             <a:pPr lvl="0"/>
             <a:r>
-              <a:rPr lang="ru-RU" smtClean="0"/>
+              <a:rPr lang="ru-RU"/>
               <a:t>Образец текста</a:t>
             </a:r>
           </a:p>
           <a:p>
             <a:pPr lvl="1"/>
             <a:r>
-              <a:rPr lang="ru-RU" smtClean="0"/>
+              <a:rPr lang="ru-RU"/>
               <a:t>Второй уровень</a:t>
             </a:r>
           </a:p>
           <a:p>
             <a:pPr lvl="2"/>
             <a:r>
-              <a:rPr lang="ru-RU" smtClean="0"/>
+              <a:rPr lang="ru-RU"/>
               <a:t>Третий уровень</a:t>
             </a:r>
           </a:p>
           <a:p>
             <a:pPr lvl="3"/>
             <a:r>
-              <a:rPr lang="ru-RU" smtClean="0"/>
+              <a:rPr lang="ru-RU"/>
               <a:t>Четвертый уровень</a:t>
             </a:r>
           </a:p>
           <a:p>
             <a:pPr lvl="4"/>
             <a:r>
-              <a:rPr lang="ru-RU" smtClean="0"/>
+              <a:rPr lang="ru-RU"/>
               <a:t>Пятый уровень</a:t>
             </a:r>
             <a:endParaRPr lang="en-US" dirty="0"/>
@@ -1954,7 +1969,7 @@
           <a:lstStyle/>
           <a:p>
             <a:r>
-              <a:rPr lang="ru-RU" smtClean="0"/>
+              <a:rPr lang="ru-RU"/>
               <a:t>Образец заголовка</a:t>
             </a:r>
             <a:endParaRPr lang="en-US" dirty="0"/>
@@ -1978,7 +1993,7 @@
           <a:p>
             <a:fld id="{F38A05D3-C833-4822-B942-54F127E20656}" type="datetimeFigureOut">
               <a:rPr lang="ru-RU" smtClean="0"/>
-              <a:t>19.05.2019</a:t>
+              <a:t>30.05.2019</a:t>
             </a:fld>
             <a:endParaRPr lang="ru-RU"/>
           </a:p>
@@ -2068,7 +2083,7 @@
           <a:p>
             <a:fld id="{F38A05D3-C833-4822-B942-54F127E20656}" type="datetimeFigureOut">
               <a:rPr lang="ru-RU" smtClean="0"/>
-              <a:t>19.05.2019</a:t>
+              <a:t>30.05.2019</a:t>
             </a:fld>
             <a:endParaRPr lang="ru-RU"/>
           </a:p>
@@ -2177,7 +2192,7 @@
           </a:lstStyle>
           <a:p>
             <a:r>
-              <a:rPr lang="ru-RU" smtClean="0"/>
+              <a:rPr lang="ru-RU"/>
               <a:t>Образец заголовка</a:t>
             </a:r>
             <a:endParaRPr lang="en-US" dirty="0"/>
@@ -2234,35 +2249,35 @@
           <a:p>
             <a:pPr lvl="0"/>
             <a:r>
-              <a:rPr lang="ru-RU" smtClean="0"/>
+              <a:rPr lang="ru-RU"/>
               <a:t>Образец текста</a:t>
             </a:r>
           </a:p>
           <a:p>
             <a:pPr lvl="1"/>
             <a:r>
-              <a:rPr lang="ru-RU" smtClean="0"/>
+              <a:rPr lang="ru-RU"/>
               <a:t>Второй уровень</a:t>
             </a:r>
           </a:p>
           <a:p>
             <a:pPr lvl="2"/>
             <a:r>
-              <a:rPr lang="ru-RU" smtClean="0"/>
+              <a:rPr lang="ru-RU"/>
               <a:t>Третий уровень</a:t>
             </a:r>
           </a:p>
           <a:p>
             <a:pPr lvl="3"/>
             <a:r>
-              <a:rPr lang="ru-RU" smtClean="0"/>
+              <a:rPr lang="ru-RU"/>
               <a:t>Четвертый уровень</a:t>
             </a:r>
           </a:p>
           <a:p>
             <a:pPr lvl="4"/>
             <a:r>
-              <a:rPr lang="ru-RU" smtClean="0"/>
+              <a:rPr lang="ru-RU"/>
               <a:t>Пятый уровень</a:t>
             </a:r>
             <a:endParaRPr lang="en-US" dirty="0"/>
@@ -2333,7 +2348,7 @@
           <a:p>
             <a:pPr lvl="0"/>
             <a:r>
-              <a:rPr lang="ru-RU" smtClean="0"/>
+              <a:rPr lang="ru-RU"/>
               <a:t>Образец текста</a:t>
             </a:r>
           </a:p>
@@ -2356,7 +2371,7 @@
           <a:p>
             <a:fld id="{F38A05D3-C833-4822-B942-54F127E20656}" type="datetimeFigureOut">
               <a:rPr lang="ru-RU" smtClean="0"/>
-              <a:t>19.05.2019</a:t>
+              <a:t>30.05.2019</a:t>
             </a:fld>
             <a:endParaRPr lang="ru-RU"/>
           </a:p>
@@ -2457,7 +2472,7 @@
           </a:lstStyle>
           <a:p>
             <a:r>
-              <a:rPr lang="ru-RU" smtClean="0"/>
+              <a:rPr lang="ru-RU"/>
               <a:t>Образец заголовка</a:t>
             </a:r>
             <a:endParaRPr lang="en-US" dirty="0"/>
@@ -2534,7 +2549,7 @@
           </a:lstStyle>
           <a:p>
             <a:r>
-              <a:rPr lang="ru-RU" smtClean="0"/>
+              <a:rPr lang="ru-RU"/>
               <a:t>Вставка рисунка</a:t>
             </a:r>
             <a:endParaRPr lang="en-US" dirty="0"/>
@@ -2602,7 +2617,7 @@
           <a:p>
             <a:pPr lvl="0"/>
             <a:r>
-              <a:rPr lang="ru-RU" smtClean="0"/>
+              <a:rPr lang="ru-RU"/>
               <a:t>Образец текста</a:t>
             </a:r>
           </a:p>
@@ -2625,7 +2640,7 @@
           <a:p>
             <a:fld id="{F38A05D3-C833-4822-B942-54F127E20656}" type="datetimeFigureOut">
               <a:rPr lang="ru-RU" smtClean="0"/>
-              <a:t>19.05.2019</a:t>
+              <a:t>30.05.2019</a:t>
             </a:fld>
             <a:endParaRPr lang="ru-RU"/>
           </a:p>
@@ -2729,7 +2744,7 @@
           <a:lstStyle/>
           <a:p>
             <a:r>
-              <a:rPr lang="ru-RU" smtClean="0"/>
+              <a:rPr lang="ru-RU"/>
               <a:t>Образец заголовка</a:t>
             </a:r>
             <a:endParaRPr lang="en-US" dirty="0"/>
@@ -2763,38 +2778,38 @@
           <a:p>
             <a:pPr lvl="0"/>
             <a:r>
-              <a:rPr lang="ru-RU" smtClean="0"/>
+              <a:rPr lang="ru-RU"/>
               <a:t>Образец текста</a:t>
             </a:r>
           </a:p>
           <a:p>
             <a:pPr lvl="1"/>
             <a:r>
-              <a:rPr lang="ru-RU" smtClean="0"/>
+              <a:rPr lang="ru-RU"/>
               <a:t>Второй уровень</a:t>
             </a:r>
           </a:p>
           <a:p>
             <a:pPr lvl="2"/>
             <a:r>
-              <a:rPr lang="ru-RU" smtClean="0"/>
+              <a:rPr lang="ru-RU"/>
               <a:t>Третий уровень</a:t>
             </a:r>
           </a:p>
           <a:p>
             <a:pPr lvl="3"/>
             <a:r>
-              <a:rPr lang="ru-RU" smtClean="0"/>
+              <a:rPr lang="ru-RU"/>
               <a:t>Четвертый уровень</a:t>
             </a:r>
           </a:p>
           <a:p>
             <a:pPr lvl="4"/>
             <a:r>
-              <a:rPr lang="ru-RU" smtClean="0"/>
+              <a:rPr lang="ru-RU"/>
               <a:t>Пятый уровень</a:t>
             </a:r>
-            <a:endParaRPr lang="en-US" dirty="0" smtClean="0"/>
+            <a:endParaRPr lang="en-US" dirty="0"/>
           </a:p>
         </p:txBody>
       </p:sp>
@@ -2835,7 +2850,7 @@
           <a:p>
             <a:fld id="{F38A05D3-C833-4822-B942-54F127E20656}" type="datetimeFigureOut">
               <a:rPr lang="ru-RU" smtClean="0"/>
-              <a:t>19.05.2019</a:t>
+              <a:t>30.05.2019</a:t>
             </a:fld>
             <a:endParaRPr lang="ru-RU"/>
           </a:p>
@@ -3365,52 +3380,101 @@
         </p:nvSpPr>
         <p:spPr>
           <a:xfrm>
-            <a:off x="1763688" y="3124200"/>
-            <a:ext cx="6694512" cy="1894362"/>
+            <a:off x="107504" y="260648"/>
+            <a:ext cx="8928992" cy="4332762"/>
           </a:xfrm>
         </p:spPr>
         <p:txBody>
           <a:bodyPr>
-            <a:normAutofit fontScale="90000"/>
+            <a:noAutofit/>
           </a:bodyPr>
           <a:lstStyle/>
           <a:p>
             <a:r>
-              <a:rPr lang="uk-UA" dirty="0"/>
-              <a:t>Розробка </a:t>
-            </a:r>
-            <a:r>
-              <a:rPr lang="uk-UA" dirty="0" err="1"/>
-              <a:t>застосунку</a:t>
-            </a:r>
-            <a:r>
-              <a:rPr lang="uk-UA" dirty="0"/>
+              <a:rPr lang="ru-RU" sz="5400" dirty="0" err="1"/>
+              <a:t>Дипломна</a:t>
+            </a:r>
+            <a:r>
+              <a:rPr lang="ru-RU" sz="5400" dirty="0"/>
+              <a:t> робота на тему: «</a:t>
+            </a:r>
+            <a:r>
+              <a:rPr lang="ru-RU" sz="5400" dirty="0" err="1"/>
+              <a:t>Мобільний</a:t>
+            </a:r>
+            <a:r>
+              <a:rPr lang="ru-RU" sz="5400" dirty="0"/>
               <a:t> </a:t>
             </a:r>
             <a:r>
-              <a:rPr lang="uk-UA" dirty="0" err="1"/>
-              <a:t>Месенджер</a:t>
+              <a:rPr lang="ru-RU" sz="5400" dirty="0" err="1"/>
+              <a:t>застосунок</a:t>
+            </a:r>
+            <a:br>
+              <a:rPr lang="ru-RU" sz="5400" dirty="0"/>
+            </a:br>
+            <a:r>
+              <a:rPr lang="ru-RU" sz="5400" dirty="0"/>
+              <a:t>мессенджер </a:t>
+            </a:r>
+            <a:r>
+              <a:rPr lang="ru-RU" sz="5400" dirty="0" err="1"/>
+              <a:t>із</a:t>
+            </a:r>
+            <a:r>
+              <a:rPr lang="ru-RU" sz="5400" dirty="0"/>
+              <a:t> </a:t>
+            </a:r>
+            <a:r>
+              <a:rPr lang="ru-RU" sz="5400" dirty="0" err="1"/>
+              <a:t>використанням</a:t>
+            </a:r>
+            <a:br>
+              <a:rPr lang="ru-RU" sz="5400" dirty="0"/>
+            </a:br>
+            <a:r>
+              <a:rPr lang="ru-RU" sz="5400" dirty="0" err="1"/>
+              <a:t>сучасних</a:t>
+            </a:r>
+            <a:r>
+              <a:rPr lang="ru-RU" sz="5400" dirty="0"/>
+              <a:t> </a:t>
+            </a:r>
+            <a:r>
+              <a:rPr lang="ru-RU" sz="5400" dirty="0" err="1"/>
+              <a:t>технологій</a:t>
+            </a:r>
+            <a:r>
+              <a:rPr lang="ru-RU" sz="5400" dirty="0"/>
+              <a:t>»</a:t>
+            </a:r>
+          </a:p>
+        </p:txBody>
+      </p:sp>
+      <p:sp>
+        <p:nvSpPr>
+          <p:cNvPr id="3" name="Подзаголовок 2"/>
+          <p:cNvSpPr>
+            <a:spLocks noGrp="1"/>
+          </p:cNvSpPr>
+          <p:nvPr>
+            <p:ph type="subTitle" idx="1"/>
+          </p:nvPr>
+        </p:nvSpPr>
+        <p:spPr/>
+        <p:txBody>
+          <a:bodyPr/>
+          <a:lstStyle/>
+          <a:p>
+            <a:r>
+              <a:rPr lang="ru-RU" dirty="0"/>
+              <a:t>Автор: Ярослав </a:t>
+            </a:r>
+            <a:r>
+              <a:rPr lang="ru-RU" dirty="0" err="1"/>
+              <a:t>Гозак</a:t>
             </a:r>
             <a:endParaRPr lang="ru-RU" dirty="0"/>
-          </a:p>
-        </p:txBody>
-      </p:sp>
-      <p:sp>
-        <p:nvSpPr>
-          <p:cNvPr id="3" name="Подзаголовок 2"/>
-          <p:cNvSpPr>
-            <a:spLocks noGrp="1"/>
-          </p:cNvSpPr>
-          <p:nvPr>
-            <p:ph type="subTitle" idx="1"/>
-          </p:nvPr>
-        </p:nvSpPr>
-        <p:spPr/>
-        <p:txBody>
-          <a:bodyPr/>
-          <a:lstStyle/>
-          <a:p>
-            <a:endParaRPr lang="ru-RU"/>
           </a:p>
         </p:txBody>
       </p:sp>
@@ -3424,13 +3488,6 @@
   <p:clrMapOvr>
     <a:masterClrMapping/>
   </p:clrMapOvr>
-  <p:timing>
-    <p:tnLst>
-      <p:par>
-        <p:cTn id="1" dur="indefinite" restart="never" nodeType="tmRoot"/>
-      </p:par>
-    </p:tnLst>
-  </p:timing>
 </p:sld>
 </file>
 
@@ -3467,7 +3524,7 @@
           <a:lstStyle/>
           <a:p>
             <a:r>
-              <a:rPr lang="uk-UA" dirty="0" smtClean="0"/>
+              <a:rPr lang="uk-UA" dirty="0"/>
               <a:t>Схема бази даних</a:t>
             </a:r>
             <a:endParaRPr lang="ru-RU" dirty="0"/>
@@ -3552,8 +3609,8 @@
           <a:lstStyle/>
           <a:p>
             <a:r>
-              <a:rPr lang="uk-UA" dirty="0" smtClean="0"/>
-              <a:t>Користувацький інтерфейс</a:t>
+              <a:rPr lang="uk-UA" dirty="0"/>
+              <a:t>Користувацький інтерфейс застосунку</a:t>
             </a:r>
             <a:endParaRPr lang="ru-RU" dirty="0"/>
           </a:p>
@@ -3598,92 +3655,6 @@
   <p:clrMapOvr>
     <a:masterClrMapping/>
   </p:clrMapOvr>
-  <p:timing>
-    <p:tnLst>
-      <p:par>
-        <p:cTn id="1" dur="indefinite" restart="never" nodeType="tmRoot"/>
-      </p:par>
-    </p:tnLst>
-  </p:timing>
-</p:sld>
-</file>
-
-<file path=ppt/slides/slide12.xml><?xml version="1.0" encoding="utf-8"?>
-<p:sld xmlns:a="http://schemas.openxmlformats.org/drawingml/2006/main" xmlns:r="http://schemas.openxmlformats.org/officeDocument/2006/relationships" xmlns:p="http://schemas.openxmlformats.org/presentationml/2006/main">
-  <p:cSld>
-    <p:spTree>
-      <p:nvGrpSpPr>
-        <p:cNvPr id="1" name=""/>
-        <p:cNvGrpSpPr/>
-        <p:nvPr/>
-      </p:nvGrpSpPr>
-      <p:grpSpPr>
-        <a:xfrm>
-          <a:off x="0" y="0"/>
-          <a:ext cx="0" cy="0"/>
-          <a:chOff x="0" y="0"/>
-          <a:chExt cx="0" cy="0"/>
-        </a:xfrm>
-      </p:grpSpPr>
-      <p:sp>
-        <p:nvSpPr>
-          <p:cNvPr id="2" name="Заголовок 1"/>
-          <p:cNvSpPr>
-            <a:spLocks noGrp="1"/>
-          </p:cNvSpPr>
-          <p:nvPr>
-            <p:ph type="title"/>
-          </p:nvPr>
-        </p:nvSpPr>
-        <p:spPr/>
-        <p:txBody>
-          <a:bodyPr/>
-          <a:lstStyle/>
-          <a:p>
-            <a:r>
-              <a:rPr lang="uk-UA" dirty="0" smtClean="0"/>
-              <a:t>Запитання?</a:t>
-            </a:r>
-            <a:endParaRPr lang="ru-RU" dirty="0"/>
-          </a:p>
-        </p:txBody>
-      </p:sp>
-      <p:sp>
-        <p:nvSpPr>
-          <p:cNvPr id="3" name="Объект 2"/>
-          <p:cNvSpPr>
-            <a:spLocks noGrp="1"/>
-          </p:cNvSpPr>
-          <p:nvPr>
-            <p:ph idx="1"/>
-          </p:nvPr>
-        </p:nvSpPr>
-        <p:spPr/>
-        <p:txBody>
-          <a:bodyPr/>
-          <a:lstStyle/>
-          <a:p>
-            <a:endParaRPr lang="ru-RU" dirty="0"/>
-          </a:p>
-        </p:txBody>
-      </p:sp>
-    </p:spTree>
-    <p:extLst>
-      <p:ext uri="{BB962C8B-B14F-4D97-AF65-F5344CB8AC3E}">
-        <p14:creationId xmlns:p14="http://schemas.microsoft.com/office/powerpoint/2010/main" val="357242693"/>
-      </p:ext>
-    </p:extLst>
-  </p:cSld>
-  <p:clrMapOvr>
-    <a:masterClrMapping/>
-  </p:clrMapOvr>
-  <p:timing>
-    <p:tnLst>
-      <p:par>
-        <p:cTn id="1" dur="indefinite" restart="never" nodeType="tmRoot"/>
-      </p:par>
-    </p:tnLst>
-  </p:timing>
 </p:sld>
 </file>
 
@@ -3714,106 +3685,63 @@
             <p:ph type="title"/>
           </p:nvPr>
         </p:nvSpPr>
+        <p:spPr>
+          <a:xfrm>
+            <a:off x="107504" y="0"/>
+            <a:ext cx="8928992" cy="1268760"/>
+          </a:xfrm>
+        </p:spPr>
+        <p:txBody>
+          <a:bodyPr/>
+          <a:lstStyle/>
+          <a:p>
+            <a:r>
+              <a:rPr lang="uk-UA" dirty="0"/>
+              <a:t>Актуальність дослідження</a:t>
+            </a:r>
+            <a:endParaRPr lang="ru-RU" dirty="0"/>
+          </a:p>
+        </p:txBody>
+      </p:sp>
+      <p:sp>
+        <p:nvSpPr>
+          <p:cNvPr id="3" name="Объект 2"/>
+          <p:cNvSpPr>
+            <a:spLocks noGrp="1"/>
+          </p:cNvSpPr>
+          <p:nvPr>
+            <p:ph idx="1"/>
+          </p:nvPr>
+        </p:nvSpPr>
         <p:spPr/>
         <p:txBody>
-          <a:bodyPr/>
-          <a:lstStyle/>
-          <a:p>
-            <a:r>
-              <a:rPr lang="uk-UA" dirty="0" smtClean="0"/>
-              <a:t>Актуальність дослідження</a:t>
-            </a:r>
-            <a:endParaRPr lang="ru-RU" dirty="0"/>
-          </a:p>
-        </p:txBody>
-      </p:sp>
-      <p:sp>
-        <p:nvSpPr>
-          <p:cNvPr id="3" name="Объект 2"/>
-          <p:cNvSpPr>
-            <a:spLocks noGrp="1"/>
-          </p:cNvSpPr>
-          <p:nvPr>
-            <p:ph idx="1"/>
-          </p:nvPr>
-        </p:nvSpPr>
-        <p:spPr/>
-        <p:txBody>
-          <a:bodyPr/>
-          <a:lstStyle/>
-          <a:p>
-            <a:pPr marL="0" indent="0">
-              <a:buNone/>
-            </a:pPr>
-            <a:r>
-              <a:rPr lang="uk-UA" dirty="0" smtClean="0"/>
-              <a:t>Розробка програмного </a:t>
-            </a:r>
-            <a:r>
-              <a:rPr lang="uk-UA" dirty="0" err="1" smtClean="0"/>
-              <a:t>застосунку</a:t>
-            </a:r>
-            <a:r>
-              <a:rPr lang="uk-UA" dirty="0" smtClean="0"/>
-              <a:t>, в тому числі і </a:t>
-            </a:r>
-            <a:r>
-              <a:rPr lang="uk-UA" dirty="0" err="1" smtClean="0"/>
-              <a:t>веб</a:t>
-            </a:r>
-            <a:r>
-              <a:rPr lang="uk-UA" dirty="0" smtClean="0"/>
-              <a:t> </a:t>
-            </a:r>
-            <a:r>
-              <a:rPr lang="uk-UA" dirty="0" err="1" smtClean="0"/>
-              <a:t>застосунку</a:t>
-            </a:r>
-            <a:r>
-              <a:rPr lang="uk-UA" dirty="0" smtClean="0"/>
-              <a:t>, завжди є довготривалою роботою. Тож завжди актуальною проблемою є проблема пришвидшення розробки </a:t>
-            </a:r>
-            <a:r>
-              <a:rPr lang="uk-UA" dirty="0" err="1" smtClean="0"/>
-              <a:t>застосунків</a:t>
-            </a:r>
-            <a:r>
-              <a:rPr lang="uk-UA" dirty="0" smtClean="0"/>
-              <a:t>. Дослідження проводиться на прикладі розробки </a:t>
-            </a:r>
-            <a:r>
-              <a:rPr lang="uk-UA" dirty="0" err="1" smtClean="0"/>
-              <a:t>застосунку</a:t>
-            </a:r>
-            <a:r>
-              <a:rPr lang="uk-UA" dirty="0" smtClean="0"/>
-              <a:t> </a:t>
-            </a:r>
-            <a:r>
-              <a:rPr lang="uk-UA" dirty="0" err="1" smtClean="0"/>
-              <a:t>Месенджер</a:t>
-            </a:r>
-            <a:r>
-              <a:rPr lang="uk-UA" dirty="0" smtClean="0"/>
-              <a:t> із порівнянням поширених проблем у </a:t>
-            </a:r>
-            <a:r>
-              <a:rPr lang="uk-UA" dirty="0" err="1" smtClean="0"/>
-              <a:t>веб</a:t>
-            </a:r>
-            <a:r>
-              <a:rPr lang="uk-UA" dirty="0" smtClean="0"/>
-              <a:t> </a:t>
-            </a:r>
-            <a:r>
-              <a:rPr lang="uk-UA" dirty="0" err="1" smtClean="0"/>
-              <a:t>застосунках</a:t>
-            </a:r>
-            <a:r>
-              <a:rPr lang="uk-UA" dirty="0" smtClean="0"/>
-              <a:t> – безпекою.</a:t>
-            </a:r>
-            <a:endParaRPr lang="ru-RU" dirty="0"/>
+          <a:bodyPr>
+            <a:normAutofit/>
+          </a:bodyPr>
+          <a:lstStyle/>
+          <a:p>
+            <a:pPr algn="just"/>
+            <a:r>
+              <a:rPr lang="uk-UA" dirty="0"/>
+              <a:t>Мобільні застосунки увійшли в наше життя і стали невід’ємною частиною програмного забезпечення на будь-якому телефоні, проте вони не забезпечують </a:t>
+            </a:r>
+            <a:r>
+              <a:rPr lang="uk-UA" dirty="0" err="1"/>
+              <a:t>кросплатформеності</a:t>
+            </a:r>
+            <a:r>
+              <a:rPr lang="uk-UA" dirty="0"/>
+              <a:t> і потребують окремого застосунку на десктоп, тож поява </a:t>
+            </a:r>
+            <a:r>
+              <a:rPr lang="en-US" dirty="0"/>
+              <a:t>PWA </a:t>
+            </a:r>
+            <a:r>
+              <a:rPr lang="uk-UA" dirty="0"/>
+              <a:t>технології несе можливості зниження ціни та часу розробки продукту за рахунок розробки лише одного застосунку, призначеного для будь-яких платформ.</a:t>
+            </a:r>
+            <a:endParaRPr lang="ru-UA" dirty="0"/>
           </a:p>
         </p:txBody>
       </p:sp>
@@ -3827,13 +3755,6 @@
   <p:clrMapOvr>
     <a:masterClrMapping/>
   </p:clrMapOvr>
-  <p:timing>
-    <p:tnLst>
-      <p:par>
-        <p:cTn id="1" dur="indefinite" restart="never" nodeType="tmRoot"/>
-      </p:par>
-    </p:tnLst>
-  </p:timing>
 </p:sld>
 </file>
 
@@ -3864,110 +3785,108 @@
             <p:ph type="title"/>
           </p:nvPr>
         </p:nvSpPr>
+        <p:spPr>
+          <a:xfrm>
+            <a:off x="107504" y="0"/>
+            <a:ext cx="8928992" cy="1268760"/>
+          </a:xfrm>
+        </p:spPr>
+        <p:txBody>
+          <a:bodyPr/>
+          <a:lstStyle/>
+          <a:p>
+            <a:r>
+              <a:rPr lang="uk-UA" dirty="0"/>
+              <a:t>Мета та завдання</a:t>
+            </a:r>
+            <a:endParaRPr lang="ru-RU" dirty="0"/>
+          </a:p>
+        </p:txBody>
+      </p:sp>
+      <p:sp>
+        <p:nvSpPr>
+          <p:cNvPr id="3" name="Объект 2"/>
+          <p:cNvSpPr>
+            <a:spLocks noGrp="1"/>
+          </p:cNvSpPr>
+          <p:nvPr>
+            <p:ph idx="1"/>
+          </p:nvPr>
+        </p:nvSpPr>
         <p:spPr/>
         <p:txBody>
-          <a:bodyPr/>
-          <a:lstStyle/>
-          <a:p>
+          <a:bodyPr>
+            <a:normAutofit/>
+          </a:bodyPr>
+          <a:lstStyle/>
+          <a:p>
+            <a:pPr marL="0" indent="0">
+              <a:buNone/>
+            </a:pPr>
             <a:r>
               <a:rPr lang="uk-UA" dirty="0"/>
-              <a:t>Мета дослідження</a:t>
-            </a:r>
-            <a:endParaRPr lang="ru-RU" dirty="0"/>
-          </a:p>
-        </p:txBody>
-      </p:sp>
-      <p:sp>
-        <p:nvSpPr>
-          <p:cNvPr id="3" name="Объект 2"/>
-          <p:cNvSpPr>
-            <a:spLocks noGrp="1"/>
-          </p:cNvSpPr>
-          <p:nvPr>
-            <p:ph idx="1"/>
-          </p:nvPr>
-        </p:nvSpPr>
-        <p:spPr/>
-        <p:txBody>
-          <a:bodyPr/>
-          <a:lstStyle/>
+              <a:t>Мета роботи спрямована на вирішення важливої прикладної задачі, пов’язаної з інтерактивним обміном повідомленнями шляхом реалізації веб застосунку, на основі технологій ASP.NET та </a:t>
+            </a:r>
+            <a:r>
+              <a:rPr lang="en-US" dirty="0"/>
+              <a:t>PWA</a:t>
+            </a:r>
+            <a:r>
+              <a:rPr lang="uk-UA" dirty="0"/>
+              <a:t>.</a:t>
+            </a:r>
+            <a:endParaRPr lang="ru-UA" dirty="0"/>
+          </a:p>
           <a:p>
             <a:pPr marL="0" indent="0">
               <a:buNone/>
             </a:pPr>
             <a:r>
               <a:rPr lang="uk-UA" dirty="0"/>
-              <a:t>Метою дипломної роботи є дослідження сучасних технологій </a:t>
-            </a:r>
-            <a:r>
-              <a:rPr lang="uk-UA" dirty="0" err="1"/>
-              <a:t>веб</a:t>
-            </a:r>
+              <a:t>Для досягнення мети треба вирішити такі завдання:</a:t>
+            </a:r>
+            <a:endParaRPr lang="ru-UA" dirty="0"/>
+          </a:p>
+          <a:p>
+            <a:pPr lvl="0"/>
             <a:r>
               <a:rPr lang="uk-UA" dirty="0"/>
-              <a:t> програмування та розробка </a:t>
-            </a:r>
-            <a:r>
-              <a:rPr lang="uk-UA" dirty="0" err="1"/>
-              <a:t>веб</a:t>
-            </a:r>
+              <a:t>дослідити теоретичні основи розробки та існуючі веб застосунки;</a:t>
+            </a:r>
+            <a:endParaRPr lang="ru-UA" dirty="0"/>
+          </a:p>
+          <a:p>
+            <a:pPr lvl="0"/>
             <a:r>
               <a:rPr lang="uk-UA" dirty="0"/>
-              <a:t> </a:t>
-            </a:r>
-            <a:r>
-              <a:rPr lang="uk-UA" dirty="0" err="1"/>
-              <a:t>застосунку</a:t>
-            </a:r>
+              <a:t>проаналізувати архітектурні рішення веб розробки;</a:t>
+            </a:r>
+            <a:endParaRPr lang="ru-UA" dirty="0"/>
+          </a:p>
+          <a:p>
+            <a:pPr lvl="0"/>
             <a:r>
               <a:rPr lang="uk-UA" dirty="0"/>
-              <a:t> </a:t>
-            </a:r>
-            <a:r>
-              <a:rPr lang="uk-UA" dirty="0" err="1"/>
-              <a:t>Месенджер</a:t>
-            </a:r>
-            <a:r>
-              <a:rPr lang="uk-UA" dirty="0"/>
-              <a:t> засобами </a:t>
-            </a:r>
-            <a:r>
-              <a:rPr lang="uk-UA" dirty="0" err="1" smtClean="0"/>
-              <a:t>фреймворку</a:t>
-            </a:r>
-            <a:r>
-              <a:rPr lang="uk-UA" dirty="0" smtClean="0"/>
-              <a:t> </a:t>
-            </a:r>
-            <a:r>
-              <a:rPr lang="uk-UA" dirty="0"/>
-              <a:t>C# </a:t>
-            </a:r>
-            <a:r>
-              <a:rPr lang="uk-UA" dirty="0" smtClean="0"/>
-              <a:t>ASP.NET.</a:t>
-            </a:r>
-            <a:endParaRPr lang="ru-RU" dirty="0"/>
+              <a:t>реалізувати застосунок  для обміну інформацією у режимі реального часу</a:t>
+            </a:r>
+            <a:r>
+              <a:rPr lang="en-US" dirty="0"/>
+              <a:t>.</a:t>
+            </a:r>
+            <a:endParaRPr lang="ru-UA" dirty="0"/>
           </a:p>
         </p:txBody>
       </p:sp>
     </p:spTree>
     <p:extLst>
       <p:ext uri="{BB962C8B-B14F-4D97-AF65-F5344CB8AC3E}">
-        <p14:creationId xmlns:p14="http://schemas.microsoft.com/office/powerpoint/2010/main" val="3717805959"/>
+        <p14:creationId xmlns:p14="http://schemas.microsoft.com/office/powerpoint/2010/main" val="1457750864"/>
       </p:ext>
     </p:extLst>
   </p:cSld>
   <p:clrMapOvr>
     <a:masterClrMapping/>
   </p:clrMapOvr>
-  <p:timing>
-    <p:tnLst>
-      <p:par>
-        <p:cTn id="1" dur="indefinite" restart="never" nodeType="tmRoot"/>
-      </p:par>
-    </p:tnLst>
-  </p:timing>
 </p:sld>
 </file>
 
@@ -3998,14 +3917,19 @@
             <p:ph type="title"/>
           </p:nvPr>
         </p:nvSpPr>
-        <p:spPr/>
+        <p:spPr>
+          <a:xfrm>
+            <a:off x="457200" y="101822"/>
+            <a:ext cx="8229600" cy="923329"/>
+          </a:xfrm>
+        </p:spPr>
         <p:txBody>
           <a:bodyPr/>
           <a:lstStyle/>
           <a:p>
             <a:r>
               <a:rPr lang="uk-UA" dirty="0"/>
-              <a:t>Завдання дослідження</a:t>
+              <a:t>Об’єкт дослідження</a:t>
             </a:r>
             <a:endParaRPr lang="ru-RU" dirty="0"/>
           </a:p>
@@ -4021,110 +3945,339 @@
             <p:ph idx="1"/>
           </p:nvPr>
         </p:nvSpPr>
-        <p:spPr/>
-        <p:txBody>
-          <a:bodyPr/>
-          <a:lstStyle/>
-          <a:p>
-            <a:pPr lvl="0"/>
-            <a:r>
-              <a:rPr lang="ru-RU" dirty="0" err="1"/>
-              <a:t>дослідити</a:t>
-            </a:r>
-            <a:r>
-              <a:rPr lang="ru-RU" dirty="0"/>
+        <p:spPr>
+          <a:xfrm>
+            <a:off x="452940" y="998267"/>
+            <a:ext cx="8229600" cy="1036712"/>
+          </a:xfrm>
+        </p:spPr>
+        <p:txBody>
+          <a:bodyPr/>
+          <a:lstStyle/>
+          <a:p>
+            <a:pPr marL="0" indent="0" algn="just">
+              <a:buNone/>
+            </a:pPr>
+            <a:r>
+              <a:rPr lang="uk-UA" dirty="0"/>
+              <a:t>Об’єктом дослідження є процес інтерактивного обміну повідомленнями</a:t>
+            </a:r>
+            <a:endParaRPr lang="ru-UA" dirty="0"/>
+          </a:p>
+        </p:txBody>
+      </p:sp>
+      <p:sp>
+        <p:nvSpPr>
+          <p:cNvPr id="4" name="Прямоугольник 3">
+            <a:extLst>
+              <a:ext uri="{FF2B5EF4-FFF2-40B4-BE49-F238E27FC236}">
+                <a16:creationId xmlns:a16="http://schemas.microsoft.com/office/drawing/2014/main" id="{9E089310-51C6-46BD-80A6-00609BD941B4}"/>
+              </a:ext>
+            </a:extLst>
+          </p:cNvPr>
+          <p:cNvSpPr/>
+          <p:nvPr/>
+        </p:nvSpPr>
+        <p:spPr>
+          <a:xfrm>
+            <a:off x="971600" y="1834085"/>
+            <a:ext cx="7358105" cy="923330"/>
+          </a:xfrm>
+          <a:prstGeom prst="rect">
+            <a:avLst/>
+          </a:prstGeom>
+        </p:spPr>
+        <p:txBody>
+          <a:bodyPr wrap="none">
+            <a:spAutoFit/>
+          </a:bodyPr>
+          <a:lstStyle/>
+          <a:p>
+            <a:r>
+              <a:rPr lang="uk-UA" sz="5400" dirty="0">
+                <a:solidFill>
+                  <a:schemeClr val="tx2"/>
+                </a:solidFill>
+                <a:effectLst>
+                  <a:outerShdw blurRad="38100" dist="38100" dir="2700000" algn="tl">
+                    <a:srgbClr val="000000">
+                      <a:alpha val="43137"/>
+                    </a:srgbClr>
+                  </a:outerShdw>
+                </a:effectLst>
+              </a:rPr>
+              <a:t>Предмет дослідження</a:t>
+            </a:r>
+            <a:endParaRPr lang="ru-UA" sz="5400" dirty="0">
+              <a:solidFill>
+                <a:schemeClr val="tx2"/>
+              </a:solidFill>
+              <a:effectLst>
+                <a:outerShdw blurRad="38100" dist="38100" dir="2700000" algn="tl">
+                  <a:srgbClr val="000000">
+                    <a:alpha val="43137"/>
+                  </a:srgbClr>
+                </a:outerShdw>
+              </a:effectLst>
+            </a:endParaRPr>
+          </a:p>
+        </p:txBody>
+      </p:sp>
+      <p:sp>
+        <p:nvSpPr>
+          <p:cNvPr id="5" name="Прямоугольник 4">
+            <a:extLst>
+              <a:ext uri="{FF2B5EF4-FFF2-40B4-BE49-F238E27FC236}">
+                <a16:creationId xmlns:a16="http://schemas.microsoft.com/office/drawing/2014/main" id="{7AC8B5F2-C68C-41F1-BE1C-F4A0D0860CFD}"/>
+              </a:ext>
+            </a:extLst>
+          </p:cNvPr>
+          <p:cNvSpPr/>
+          <p:nvPr/>
+        </p:nvSpPr>
+        <p:spPr>
+          <a:xfrm>
+            <a:off x="452940" y="2843913"/>
+            <a:ext cx="7560840" cy="830997"/>
+          </a:xfrm>
+          <a:prstGeom prst="rect">
+            <a:avLst/>
+          </a:prstGeom>
+        </p:spPr>
+        <p:txBody>
+          <a:bodyPr wrap="square">
+            <a:spAutoFit/>
+          </a:bodyPr>
+          <a:lstStyle/>
+          <a:p>
+            <a:pPr algn="just"/>
+            <a:r>
+              <a:rPr lang="ru-RU" sz="2400" dirty="0">
+                <a:solidFill>
+                  <a:schemeClr val="tx1">
+                    <a:lumMod val="50000"/>
+                    <a:lumOff val="50000"/>
+                  </a:schemeClr>
+                </a:solidFill>
+                <a:latin typeface="+mj-lt"/>
+              </a:rPr>
+              <a:t>Предметом </a:t>
+            </a:r>
+            <a:r>
+              <a:rPr lang="ru-RU" sz="2400" dirty="0" err="1">
+                <a:solidFill>
+                  <a:schemeClr val="tx1">
+                    <a:lumMod val="50000"/>
+                    <a:lumOff val="50000"/>
+                  </a:schemeClr>
+                </a:solidFill>
+                <a:latin typeface="+mj-lt"/>
+              </a:rPr>
+              <a:t>дослідження</a:t>
+            </a:r>
+            <a:r>
+              <a:rPr lang="ru-RU" sz="2400" dirty="0">
+                <a:solidFill>
+                  <a:schemeClr val="tx1">
+                    <a:lumMod val="50000"/>
+                    <a:lumOff val="50000"/>
+                  </a:schemeClr>
+                </a:solidFill>
+                <a:latin typeface="+mj-lt"/>
+              </a:rPr>
+              <a:t> є </a:t>
+            </a:r>
+            <a:r>
+              <a:rPr lang="ru-RU" sz="2400" dirty="0" err="1">
+                <a:solidFill>
+                  <a:schemeClr val="tx1">
+                    <a:lumMod val="50000"/>
+                    <a:lumOff val="50000"/>
+                  </a:schemeClr>
+                </a:solidFill>
+                <a:latin typeface="+mj-lt"/>
+              </a:rPr>
+              <a:t>застосунки</a:t>
+            </a:r>
+            <a:r>
+              <a:rPr lang="ru-RU" sz="2400" dirty="0">
+                <a:solidFill>
+                  <a:schemeClr val="tx1">
+                    <a:lumMod val="50000"/>
+                    <a:lumOff val="50000"/>
+                  </a:schemeClr>
+                </a:solidFill>
+                <a:latin typeface="+mj-lt"/>
+              </a:rPr>
               <a:t> </a:t>
             </a:r>
             <a:r>
-              <a:rPr lang="ru-RU" dirty="0" err="1"/>
-              <a:t>існуючі</a:t>
-            </a:r>
-            <a:r>
-              <a:rPr lang="ru-RU" dirty="0"/>
-              <a:t> веб-</a:t>
-            </a:r>
-            <a:r>
-              <a:rPr lang="ru-RU" dirty="0" err="1"/>
-              <a:t>застосунки</a:t>
-            </a:r>
-            <a:r>
-              <a:rPr lang="ru-RU" dirty="0"/>
-              <a:t>;</a:t>
-            </a:r>
-          </a:p>
-          <a:p>
-            <a:pPr lvl="0"/>
-            <a:r>
-              <a:rPr lang="ru-RU" dirty="0" err="1"/>
-              <a:t>проаналізувати</a:t>
-            </a:r>
-            <a:r>
-              <a:rPr lang="ru-RU" dirty="0"/>
+              <a:rPr lang="ru-RU" sz="2400" dirty="0" err="1">
+                <a:solidFill>
+                  <a:schemeClr val="tx1">
+                    <a:lumMod val="50000"/>
+                    <a:lumOff val="50000"/>
+                  </a:schemeClr>
+                </a:solidFill>
+                <a:latin typeface="+mj-lt"/>
+              </a:rPr>
+              <a:t>обміну</a:t>
+            </a:r>
+            <a:r>
+              <a:rPr lang="ru-RU" sz="2400" dirty="0">
+                <a:solidFill>
+                  <a:schemeClr val="tx1">
+                    <a:lumMod val="50000"/>
+                    <a:lumOff val="50000"/>
+                  </a:schemeClr>
+                </a:solidFill>
+                <a:latin typeface="+mj-lt"/>
+              </a:rPr>
               <a:t> </a:t>
             </a:r>
             <a:r>
-              <a:rPr lang="ru-RU" dirty="0" err="1"/>
-              <a:t>архітектурні</a:t>
-            </a:r>
-            <a:r>
-              <a:rPr lang="ru-RU" dirty="0"/>
-              <a:t> </a:t>
-            </a:r>
-            <a:r>
-              <a:rPr lang="ru-RU" dirty="0" err="1"/>
-              <a:t>рішення</a:t>
-            </a:r>
-            <a:r>
-              <a:rPr lang="ru-RU" dirty="0"/>
-              <a:t>;</a:t>
-            </a:r>
-          </a:p>
-          <a:p>
-            <a:pPr lvl="0"/>
-            <a:r>
-              <a:rPr lang="ru-RU" dirty="0" err="1"/>
-              <a:t>розробити</a:t>
-            </a:r>
-            <a:r>
-              <a:rPr lang="ru-RU" dirty="0"/>
-              <a:t> </a:t>
-            </a:r>
-            <a:r>
-              <a:rPr lang="ru-RU" dirty="0" err="1"/>
-              <a:t>застосунок</a:t>
-            </a:r>
-            <a:r>
-              <a:rPr lang="ru-RU" dirty="0"/>
-              <a:t> на </a:t>
-            </a:r>
-            <a:r>
-              <a:rPr lang="ru-RU" dirty="0" err="1"/>
-              <a:t>основі</a:t>
-            </a:r>
-            <a:r>
-              <a:rPr lang="ru-RU" dirty="0"/>
-              <a:t> ASP.NET.</a:t>
-            </a:r>
+              <a:rPr lang="ru-RU" sz="2400" dirty="0" err="1">
+                <a:solidFill>
+                  <a:schemeClr val="tx1">
+                    <a:lumMod val="50000"/>
+                    <a:lumOff val="50000"/>
+                  </a:schemeClr>
+                </a:solidFill>
+                <a:latin typeface="+mj-lt"/>
+              </a:rPr>
+              <a:t>повідомленнями</a:t>
+            </a:r>
+            <a:endParaRPr lang="ru-UA" sz="2400" dirty="0">
+              <a:solidFill>
+                <a:schemeClr val="tx1">
+                  <a:lumMod val="50000"/>
+                  <a:lumOff val="50000"/>
+                </a:schemeClr>
+              </a:solidFill>
+              <a:latin typeface="+mj-lt"/>
+            </a:endParaRPr>
+          </a:p>
+        </p:txBody>
+      </p:sp>
+      <p:sp>
+        <p:nvSpPr>
+          <p:cNvPr id="7" name="Прямоугольник 6">
+            <a:extLst>
+              <a:ext uri="{FF2B5EF4-FFF2-40B4-BE49-F238E27FC236}">
+                <a16:creationId xmlns:a16="http://schemas.microsoft.com/office/drawing/2014/main" id="{4435858C-A4ED-4CCE-98E8-4007C4A2D705}"/>
+              </a:ext>
+            </a:extLst>
+          </p:cNvPr>
+          <p:cNvSpPr/>
+          <p:nvPr/>
+        </p:nvSpPr>
+        <p:spPr>
+          <a:xfrm>
+            <a:off x="954155" y="3674910"/>
+            <a:ext cx="7019870" cy="923330"/>
+          </a:xfrm>
+          <a:prstGeom prst="rect">
+            <a:avLst/>
+          </a:prstGeom>
+        </p:spPr>
+        <p:txBody>
+          <a:bodyPr wrap="none">
+            <a:spAutoFit/>
+          </a:bodyPr>
+          <a:lstStyle/>
+          <a:p>
+            <a:r>
+              <a:rPr lang="uk-UA" sz="5400" dirty="0">
+                <a:solidFill>
+                  <a:schemeClr val="tx2"/>
+                </a:solidFill>
+                <a:effectLst>
+                  <a:outerShdw blurRad="38100" dist="38100" dir="2700000" algn="tl">
+                    <a:srgbClr val="000000">
+                      <a:alpha val="43137"/>
+                    </a:srgbClr>
+                  </a:outerShdw>
+                </a:effectLst>
+              </a:rPr>
+              <a:t>Методи дослідження</a:t>
+            </a:r>
+            <a:endParaRPr lang="ru-UA" sz="5400" dirty="0">
+              <a:solidFill>
+                <a:schemeClr val="tx2"/>
+              </a:solidFill>
+              <a:effectLst>
+                <a:outerShdw blurRad="38100" dist="38100" dir="2700000" algn="tl">
+                  <a:srgbClr val="000000">
+                    <a:alpha val="43137"/>
+                  </a:srgbClr>
+                </a:outerShdw>
+              </a:effectLst>
+            </a:endParaRPr>
+          </a:p>
+        </p:txBody>
+      </p:sp>
+      <p:sp>
+        <p:nvSpPr>
+          <p:cNvPr id="8" name="Прямоугольник 7">
+            <a:extLst>
+              <a:ext uri="{FF2B5EF4-FFF2-40B4-BE49-F238E27FC236}">
+                <a16:creationId xmlns:a16="http://schemas.microsoft.com/office/drawing/2014/main" id="{942FD4C0-97E7-4B28-B165-FEA4819FB5B2}"/>
+              </a:ext>
+            </a:extLst>
+          </p:cNvPr>
+          <p:cNvSpPr/>
+          <p:nvPr/>
+        </p:nvSpPr>
+        <p:spPr>
+          <a:xfrm>
+            <a:off x="452940" y="4797152"/>
+            <a:ext cx="7560840" cy="1938992"/>
+          </a:xfrm>
+          <a:prstGeom prst="rect">
+            <a:avLst/>
+          </a:prstGeom>
+        </p:spPr>
+        <p:txBody>
+          <a:bodyPr wrap="square">
+            <a:spAutoFit/>
+          </a:bodyPr>
+          <a:lstStyle/>
+          <a:p>
+            <a:pPr algn="just"/>
+            <a:r>
+              <a:rPr lang="uk-UA" sz="2400" dirty="0">
+                <a:solidFill>
+                  <a:schemeClr val="tx1">
+                    <a:lumMod val="50000"/>
+                    <a:lumOff val="50000"/>
+                  </a:schemeClr>
+                </a:solidFill>
+                <a:latin typeface="+mj-lt"/>
+              </a:rPr>
+              <a:t>Методом дослідження є системний аналіз і синтез знань щодо особливостей розробки веб застосунків на основі ASP.NET, а також перетворення веб застосунків на прогресивні веб застосунки</a:t>
+            </a:r>
+            <a:endParaRPr lang="ru-UA" sz="2400" dirty="0">
+              <a:solidFill>
+                <a:schemeClr val="tx1">
+                  <a:lumMod val="50000"/>
+                  <a:lumOff val="50000"/>
+                </a:schemeClr>
+              </a:solidFill>
+              <a:latin typeface="+mj-lt"/>
+            </a:endParaRPr>
           </a:p>
         </p:txBody>
       </p:sp>
     </p:spTree>
     <p:extLst>
       <p:ext uri="{BB962C8B-B14F-4D97-AF65-F5344CB8AC3E}">
-        <p14:creationId xmlns:p14="http://schemas.microsoft.com/office/powerpoint/2010/main" val="275951249"/>
+        <p14:creationId xmlns:p14="http://schemas.microsoft.com/office/powerpoint/2010/main" val="3397537596"/>
       </p:ext>
     </p:extLst>
   </p:cSld>
   <p:clrMapOvr>
     <a:masterClrMapping/>
   </p:clrMapOvr>
-  <p:timing>
-    <p:tnLst>
-      <p:par>
-        <p:cTn id="1" dur="indefinite" restart="never" nodeType="tmRoot"/>
-      </p:par>
-    </p:tnLst>
-  </p:timing>
 </p:sld>
 </file>
 
@@ -4155,56 +4308,87 @@
             <p:ph type="title"/>
           </p:nvPr>
         </p:nvSpPr>
+        <p:spPr>
+          <a:xfrm>
+            <a:off x="0" y="13380"/>
+            <a:ext cx="9144000" cy="1600200"/>
+          </a:xfrm>
+        </p:spPr>
+        <p:txBody>
+          <a:bodyPr/>
+          <a:lstStyle/>
+          <a:p>
+            <a:r>
+              <a:rPr lang="en-US" b="1" dirty="0" err="1">
+                <a:effectLst/>
+              </a:rPr>
+              <a:t>Новизна</a:t>
+            </a:r>
+            <a:r>
+              <a:rPr lang="en-US" b="1" dirty="0">
+                <a:effectLst/>
+              </a:rPr>
+              <a:t> </a:t>
+            </a:r>
+            <a:r>
+              <a:rPr lang="en-US" b="1" dirty="0" err="1">
+                <a:effectLst/>
+              </a:rPr>
+              <a:t>одержаних</a:t>
+            </a:r>
+            <a:r>
+              <a:rPr lang="en-US" b="1" dirty="0">
+                <a:effectLst/>
+              </a:rPr>
+              <a:t> </a:t>
+            </a:r>
+            <a:r>
+              <a:rPr lang="en-US" b="1" dirty="0" err="1">
+                <a:effectLst/>
+              </a:rPr>
+              <a:t>результатів</a:t>
+            </a:r>
+            <a:endParaRPr lang="ru-RU" dirty="0"/>
+          </a:p>
+        </p:txBody>
+      </p:sp>
+      <p:sp>
+        <p:nvSpPr>
+          <p:cNvPr id="3" name="Объект 2"/>
+          <p:cNvSpPr>
+            <a:spLocks noGrp="1"/>
+          </p:cNvSpPr>
+          <p:nvPr>
+            <p:ph idx="1"/>
+          </p:nvPr>
+        </p:nvSpPr>
         <p:spPr/>
         <p:txBody>
           <a:bodyPr/>
           <a:lstStyle/>
           <a:p>
+            <a:pPr marL="0" indent="0" algn="just">
+              <a:buNone/>
+            </a:pPr>
             <a:r>
               <a:rPr lang="uk-UA" dirty="0"/>
-              <a:t>Об’єкт дослідження</a:t>
-            </a:r>
-            <a:endParaRPr lang="ru-RU" dirty="0"/>
-          </a:p>
-        </p:txBody>
-      </p:sp>
-      <p:sp>
-        <p:nvSpPr>
-          <p:cNvPr id="3" name="Объект 2"/>
-          <p:cNvSpPr>
-            <a:spLocks noGrp="1"/>
-          </p:cNvSpPr>
-          <p:nvPr>
-            <p:ph idx="1"/>
-          </p:nvPr>
-        </p:nvSpPr>
-        <p:spPr/>
-        <p:txBody>
-          <a:bodyPr/>
-          <a:lstStyle/>
-          <a:p>
-            <a:pPr marL="0" lvl="0" indent="0">
-              <a:buNone/>
-            </a:pPr>
+              <a:t>Набула подальшого розвитку розробка веб-застосунку інтерактивного обміну повідомлень, який на відміну від існуючих, за рахунок використання технології  ASP.NET та PWA дає можливість використовувати застосунок в </a:t>
+            </a:r>
+            <a:r>
+              <a:rPr lang="uk-UA" dirty="0" err="1"/>
+              <a:t>офлайн</a:t>
+            </a:r>
             <a:r>
               <a:rPr lang="uk-UA" dirty="0"/>
-              <a:t>Об’єктом дослідження є </a:t>
+              <a:t> режимі як </a:t>
             </a:r>
             <a:r>
               <a:rPr lang="uk-UA" dirty="0" err="1"/>
-              <a:t>веб</a:t>
+              <a:t>нативний</a:t>
             </a:r>
             <a:r>
               <a:rPr lang="uk-UA" dirty="0"/>
-              <a:t> </a:t>
-            </a:r>
-            <a:r>
-              <a:rPr lang="uk-UA" dirty="0" err="1"/>
-              <a:t>застосунок</a:t>
-            </a:r>
-            <a:r>
-              <a:rPr lang="uk-UA" dirty="0"/>
-              <a:t> на основі ASP.NET</a:t>
+              <a:t> застосунок на мобільних платформах</a:t>
             </a:r>
             <a:endParaRPr lang="ru-RU" dirty="0"/>
           </a:p>
@@ -4213,20 +4397,13 @@
     </p:spTree>
     <p:extLst>
       <p:ext uri="{BB962C8B-B14F-4D97-AF65-F5344CB8AC3E}">
-        <p14:creationId xmlns:p14="http://schemas.microsoft.com/office/powerpoint/2010/main" val="3397537596"/>
+        <p14:creationId xmlns:p14="http://schemas.microsoft.com/office/powerpoint/2010/main" val="3968867334"/>
       </p:ext>
     </p:extLst>
   </p:cSld>
   <p:clrMapOvr>
     <a:masterClrMapping/>
   </p:clrMapOvr>
-  <p:timing>
-    <p:tnLst>
-      <p:par>
-        <p:cTn id="1" dur="indefinite" restart="never" nodeType="tmRoot"/>
-      </p:par>
-    </p:tnLst>
-  </p:timing>
 </p:sld>
 </file>
 
@@ -4249,7 +4426,13 @@
       </p:grpSpPr>
       <p:sp>
         <p:nvSpPr>
-          <p:cNvPr id="2" name="Заголовок 1"/>
+          <p:cNvPr id="2" name="Заголовок 1">
+            <a:extLst>
+              <a:ext uri="{FF2B5EF4-FFF2-40B4-BE49-F238E27FC236}">
+                <a16:creationId xmlns:a16="http://schemas.microsoft.com/office/drawing/2014/main" id="{17E13E78-5EDC-418B-966A-7B7ACD9ED890}"/>
+              </a:ext>
+            </a:extLst>
+          </p:cNvPr>
           <p:cNvSpPr>
             <a:spLocks noGrp="1"/>
           </p:cNvSpPr>
@@ -4257,22 +4440,33 @@
             <p:ph type="title"/>
           </p:nvPr>
         </p:nvSpPr>
-        <p:spPr/>
+        <p:spPr>
+          <a:xfrm>
+            <a:off x="457200" y="188640"/>
+            <a:ext cx="8229600" cy="2204864"/>
+          </a:xfrm>
+        </p:spPr>
         <p:txBody>
           <a:bodyPr/>
           <a:lstStyle/>
           <a:p>
             <a:r>
               <a:rPr lang="uk-UA" dirty="0"/>
-              <a:t>Предмет дослідження</a:t>
-            </a:r>
-            <a:endParaRPr lang="ru-RU" dirty="0"/>
-          </a:p>
-        </p:txBody>
-      </p:sp>
-      <p:sp>
-        <p:nvSpPr>
-          <p:cNvPr id="3" name="Объект 2"/>
+              <a:t>Дослідити теоретичні основи розробки та існуючі веб-застосунки</a:t>
+            </a:r>
+            <a:endParaRPr lang="ru-UA" dirty="0"/>
+          </a:p>
+        </p:txBody>
+      </p:sp>
+      <p:sp>
+        <p:nvSpPr>
+          <p:cNvPr id="3" name="Объект 2">
+            <a:extLst>
+              <a:ext uri="{FF2B5EF4-FFF2-40B4-BE49-F238E27FC236}">
+                <a16:creationId xmlns:a16="http://schemas.microsoft.com/office/drawing/2014/main" id="{43E385D7-A0FC-4086-8FC2-4FC5F8D47C8A}"/>
+              </a:ext>
+            </a:extLst>
+          </p:cNvPr>
           <p:cNvSpPr>
             <a:spLocks noGrp="1"/>
           </p:cNvSpPr>
@@ -4280,43 +4474,77 @@
             <p:ph idx="1"/>
           </p:nvPr>
         </p:nvSpPr>
-        <p:spPr/>
-        <p:txBody>
-          <a:bodyPr/>
-          <a:lstStyle/>
-          <a:p>
-            <a:pPr marL="0" indent="0">
-              <a:buNone/>
-            </a:pPr>
+        <p:spPr>
+          <a:xfrm>
+            <a:off x="457200" y="2393504"/>
+            <a:ext cx="8229600" cy="3845023"/>
+          </a:xfrm>
+        </p:spPr>
+        <p:txBody>
+          <a:bodyPr/>
+          <a:lstStyle/>
+          <a:p>
             <a:r>
               <a:rPr lang="uk-UA" dirty="0"/>
-              <a:t>Предметом дослідження є нововведення та новітні технології, що були продемонстровані у зазначених технологіях/</a:t>
+              <a:t>Було виявлено велику кількість </a:t>
             </a:r>
             <a:r>
               <a:rPr lang="uk-UA" dirty="0" err="1"/>
-              <a:t>фреймворках</a:t>
-            </a:r>
-            <a:endParaRPr lang="ru-RU" dirty="0"/>
+              <a:t>методологій</a:t>
+            </a:r>
+            <a:r>
+              <a:rPr lang="uk-UA" dirty="0"/>
+              <a:t> розробки програмних, в тому числі, веб застосунків. Найбільш популярними </a:t>
+            </a:r>
+            <a:r>
+              <a:rPr lang="uk-UA" dirty="0" err="1"/>
+              <a:t>методологіями</a:t>
+            </a:r>
+            <a:r>
+              <a:rPr lang="uk-UA" dirty="0"/>
+              <a:t> є каскадна (</a:t>
+            </a:r>
+            <a:r>
+              <a:rPr lang="uk-UA" dirty="0" err="1"/>
+              <a:t>ватерфол</a:t>
+            </a:r>
+            <a:r>
+              <a:rPr lang="uk-UA" dirty="0"/>
+              <a:t>) модель, </a:t>
+            </a:r>
+            <a:r>
+              <a:rPr lang="uk-UA" dirty="0" err="1"/>
+              <a:t>канбан</a:t>
+            </a:r>
+            <a:r>
+              <a:rPr lang="uk-UA" dirty="0"/>
+              <a:t> та </a:t>
+            </a:r>
+            <a:r>
+              <a:rPr lang="uk-UA" dirty="0" err="1"/>
+              <a:t>скрам</a:t>
+            </a:r>
+            <a:r>
+              <a:rPr lang="uk-UA" dirty="0"/>
+              <a:t>. Вибір конкретної методології залежить від багатьох чинників, в тому числі: архітектури застосунку, стилю управління компанією, кількості команд розробників.</a:t>
+            </a:r>
+            <a:endParaRPr lang="ru-UA" dirty="0"/>
+          </a:p>
+          <a:p>
+            <a:endParaRPr lang="ru-UA" dirty="0"/>
           </a:p>
         </p:txBody>
       </p:sp>
     </p:spTree>
     <p:extLst>
       <p:ext uri="{BB962C8B-B14F-4D97-AF65-F5344CB8AC3E}">
-        <p14:creationId xmlns:p14="http://schemas.microsoft.com/office/powerpoint/2010/main" val="3350957709"/>
+        <p14:creationId xmlns:p14="http://schemas.microsoft.com/office/powerpoint/2010/main" val="1969014765"/>
       </p:ext>
     </p:extLst>
   </p:cSld>
   <p:clrMapOvr>
     <a:masterClrMapping/>
   </p:clrMapOvr>
-  <p:timing>
-    <p:tnLst>
-      <p:par>
-        <p:cTn id="1" dur="indefinite" restart="never" nodeType="tmRoot"/>
-      </p:par>
-    </p:tnLst>
-  </p:timing>
 </p:sld>
 </file>
 
@@ -4339,7 +4567,13 @@
       </p:grpSpPr>
       <p:sp>
         <p:nvSpPr>
-          <p:cNvPr id="2" name="Заголовок 1"/>
+          <p:cNvPr id="2" name="Заголовок 1">
+            <a:extLst>
+              <a:ext uri="{FF2B5EF4-FFF2-40B4-BE49-F238E27FC236}">
+                <a16:creationId xmlns:a16="http://schemas.microsoft.com/office/drawing/2014/main" id="{17E13E78-5EDC-418B-966A-7B7ACD9ED890}"/>
+              </a:ext>
+            </a:extLst>
+          </p:cNvPr>
           <p:cNvSpPr>
             <a:spLocks noGrp="1"/>
           </p:cNvSpPr>
@@ -4347,22 +4581,34 @@
             <p:ph type="title"/>
           </p:nvPr>
         </p:nvSpPr>
-        <p:spPr/>
-        <p:txBody>
-          <a:bodyPr/>
-          <a:lstStyle/>
-          <a:p>
+        <p:spPr>
+          <a:xfrm>
+            <a:off x="457200" y="188640"/>
+            <a:ext cx="8229600" cy="2204864"/>
+          </a:xfrm>
+        </p:spPr>
+        <p:txBody>
+          <a:bodyPr/>
+          <a:lstStyle/>
+          <a:p>
+            <a:pPr lvl="0"/>
             <a:r>
               <a:rPr lang="uk-UA" dirty="0"/>
-              <a:t>Методи дослідження</a:t>
-            </a:r>
-            <a:endParaRPr lang="ru-RU" dirty="0"/>
-          </a:p>
-        </p:txBody>
-      </p:sp>
-      <p:sp>
-        <p:nvSpPr>
-          <p:cNvPr id="3" name="Объект 2"/>
+              <a:t>Проаналізувати архітектурні рішення веб розробки;</a:t>
+            </a:r>
+            <a:endParaRPr lang="ru-UA" dirty="0"/>
+          </a:p>
+        </p:txBody>
+      </p:sp>
+      <p:sp>
+        <p:nvSpPr>
+          <p:cNvPr id="3" name="Объект 2">
+            <a:extLst>
+              <a:ext uri="{FF2B5EF4-FFF2-40B4-BE49-F238E27FC236}">
+                <a16:creationId xmlns:a16="http://schemas.microsoft.com/office/drawing/2014/main" id="{43E385D7-A0FC-4086-8FC2-4FC5F8D47C8A}"/>
+              </a:ext>
+            </a:extLst>
+          </p:cNvPr>
           <p:cNvSpPr>
             <a:spLocks noGrp="1"/>
           </p:cNvSpPr>
@@ -4370,55 +4616,53 @@
             <p:ph idx="1"/>
           </p:nvPr>
         </p:nvSpPr>
-        <p:spPr/>
-        <p:txBody>
-          <a:bodyPr/>
-          <a:lstStyle/>
-          <a:p>
-            <a:pPr marL="0" indent="0">
-              <a:buNone/>
-            </a:pPr>
+        <p:spPr>
+          <a:xfrm>
+            <a:off x="457200" y="2393504"/>
+            <a:ext cx="8229600" cy="3845023"/>
+          </a:xfrm>
+        </p:spPr>
+        <p:txBody>
+          <a:bodyPr/>
+          <a:lstStyle/>
+          <a:p>
             <a:r>
               <a:rPr lang="uk-UA" dirty="0"/>
-              <a:t>Методом дослідження є системний аналіз і синтез знань щодо особливостей розробки </a:t>
+              <a:t>В залежності від розміру веб застосунку його архітектура може бути монолітною чи </a:t>
             </a:r>
             <a:r>
               <a:rPr lang="uk-UA" dirty="0" err="1"/>
-              <a:t>веб</a:t>
+              <a:t>мікросервісною</a:t>
             </a:r>
             <a:r>
               <a:rPr lang="uk-UA" dirty="0"/>
-              <a:t> </a:t>
+              <a:t>. Більшість веб-застосунків інтерактивного обміну повідомленнями мають складну серверну частину із великою кількістю бізнес-логіки, тож більшість використовує </a:t>
             </a:r>
             <a:r>
               <a:rPr lang="uk-UA" dirty="0" err="1"/>
-              <a:t>застосунків</a:t>
+              <a:t>мікросервісну</a:t>
             </a:r>
             <a:r>
               <a:rPr lang="uk-UA" dirty="0"/>
-              <a:t> на основі ASP.NET</a:t>
-            </a:r>
-            <a:endParaRPr lang="ru-RU" dirty="0"/>
+              <a:t> архітектуру.</a:t>
+            </a:r>
+            <a:endParaRPr lang="ru-UA" dirty="0"/>
+          </a:p>
+          <a:p>
+            <a:endParaRPr lang="ru-UA" dirty="0"/>
           </a:p>
         </p:txBody>
       </p:sp>
     </p:spTree>
     <p:extLst>
       <p:ext uri="{BB962C8B-B14F-4D97-AF65-F5344CB8AC3E}">
-        <p14:creationId xmlns:p14="http://schemas.microsoft.com/office/powerpoint/2010/main" val="2644617629"/>
+        <p14:creationId xmlns:p14="http://schemas.microsoft.com/office/powerpoint/2010/main" val="697866335"/>
       </p:ext>
     </p:extLst>
   </p:cSld>
   <p:clrMapOvr>
     <a:masterClrMapping/>
   </p:clrMapOvr>
-  <p:timing>
-    <p:tnLst>
-      <p:par>
-        <p:cTn id="1" dur="indefinite" restart="never" nodeType="tmRoot"/>
-      </p:par>
-    </p:tnLst>
-  </p:timing>
 </p:sld>
 </file>
 
@@ -4441,7 +4685,13 @@
       </p:grpSpPr>
       <p:sp>
         <p:nvSpPr>
-          <p:cNvPr id="2" name="Заголовок 1"/>
+          <p:cNvPr id="2" name="Заголовок 1">
+            <a:extLst>
+              <a:ext uri="{FF2B5EF4-FFF2-40B4-BE49-F238E27FC236}">
+                <a16:creationId xmlns:a16="http://schemas.microsoft.com/office/drawing/2014/main" id="{17E13E78-5EDC-418B-966A-7B7ACD9ED890}"/>
+              </a:ext>
+            </a:extLst>
+          </p:cNvPr>
           <p:cNvSpPr>
             <a:spLocks noGrp="1"/>
           </p:cNvSpPr>
@@ -4449,26 +4699,38 @@
             <p:ph type="title"/>
           </p:nvPr>
         </p:nvSpPr>
-        <p:spPr/>
-        <p:txBody>
-          <a:bodyPr/>
-          <a:lstStyle/>
-          <a:p>
-            <a:r>
-              <a:rPr lang="uk-UA" dirty="0" smtClean="0"/>
-              <a:t>Архітектура </a:t>
-            </a:r>
-            <a:r>
-              <a:rPr lang="uk-UA" dirty="0" err="1" smtClean="0"/>
-              <a:t>застосунку</a:t>
-            </a:r>
-            <a:endParaRPr lang="ru-RU" dirty="0"/>
-          </a:p>
-        </p:txBody>
-      </p:sp>
-      <p:sp>
-        <p:nvSpPr>
-          <p:cNvPr id="3" name="Объект 2"/>
+        <p:spPr>
+          <a:xfrm>
+            <a:off x="179512" y="188640"/>
+            <a:ext cx="8784976" cy="2204864"/>
+          </a:xfrm>
+        </p:spPr>
+        <p:txBody>
+          <a:bodyPr/>
+          <a:lstStyle/>
+          <a:p>
+            <a:pPr lvl="0"/>
+            <a:r>
+              <a:rPr lang="uk-UA" dirty="0"/>
+              <a:t>Реалізувати застосунок  для обміну інформацією у режимі реального часу</a:t>
+            </a:r>
+            <a:r>
+              <a:rPr lang="en-US" dirty="0"/>
+              <a:t>.</a:t>
+            </a:r>
+            <a:endParaRPr lang="ru-UA" dirty="0"/>
+          </a:p>
+        </p:txBody>
+      </p:sp>
+      <p:sp>
+        <p:nvSpPr>
+          <p:cNvPr id="3" name="Объект 2">
+            <a:extLst>
+              <a:ext uri="{FF2B5EF4-FFF2-40B4-BE49-F238E27FC236}">
+                <a16:creationId xmlns:a16="http://schemas.microsoft.com/office/drawing/2014/main" id="{43E385D7-A0FC-4086-8FC2-4FC5F8D47C8A}"/>
+              </a:ext>
+            </a:extLst>
+          </p:cNvPr>
           <p:cNvSpPr>
             <a:spLocks noGrp="1"/>
           </p:cNvSpPr>
@@ -4476,91 +4738,223 @@
             <p:ph idx="1"/>
           </p:nvPr>
         </p:nvSpPr>
-        <p:spPr/>
-        <p:txBody>
-          <a:bodyPr/>
-          <a:lstStyle/>
-          <a:p>
-            <a:pPr marL="0" indent="0">
-              <a:buNone/>
-            </a:pPr>
-            <a:r>
-              <a:rPr lang="uk-UA" dirty="0" smtClean="0"/>
-              <a:t>Платформа </a:t>
-            </a:r>
-            <a:r>
-              <a:rPr lang="en-US" dirty="0" smtClean="0"/>
-              <a:t>ASP.NET </a:t>
-            </a:r>
-            <a:r>
-              <a:rPr lang="uk-UA" dirty="0" smtClean="0"/>
-              <a:t>надає чудовий шаблон для </a:t>
-            </a:r>
-            <a:r>
-              <a:rPr lang="en-US" dirty="0" smtClean="0"/>
-              <a:t>MVC </a:t>
-            </a:r>
-            <a:r>
-              <a:rPr lang="uk-UA" dirty="0" err="1" smtClean="0"/>
-              <a:t>застосунків</a:t>
-            </a:r>
-            <a:r>
-              <a:rPr lang="uk-UA" dirty="0" smtClean="0"/>
-              <a:t>, тож заради </a:t>
-            </a:r>
-            <a:r>
-              <a:rPr lang="uk-UA" dirty="0" err="1" smtClean="0"/>
-              <a:t>наглядності</a:t>
-            </a:r>
-            <a:r>
-              <a:rPr lang="uk-UA" dirty="0" smtClean="0"/>
-              <a:t> було обрано саме </a:t>
-            </a:r>
-            <a:r>
-              <a:rPr lang="en-US" dirty="0" smtClean="0"/>
-              <a:t>MVC </a:t>
-            </a:r>
-            <a:r>
-              <a:rPr lang="uk-UA" dirty="0" smtClean="0"/>
-              <a:t>шаблон проектування. А платформа </a:t>
-            </a:r>
-            <a:r>
-              <a:rPr lang="en-US" dirty="0" smtClean="0"/>
-              <a:t>ASP.NET Core </a:t>
-            </a:r>
-            <a:r>
-              <a:rPr lang="uk-UA" dirty="0" smtClean="0"/>
-              <a:t>розширює готовий функціонал до стандартної із можливостями розширення авторизації і легке розширення функціоналу обробки </a:t>
-            </a:r>
-            <a:r>
-              <a:rPr lang="uk-UA" dirty="0" err="1" smtClean="0"/>
-              <a:t>веб</a:t>
-            </a:r>
-            <a:r>
-              <a:rPr lang="uk-UA" dirty="0" smtClean="0"/>
-              <a:t> запитів.</a:t>
-            </a:r>
-            <a:endParaRPr lang="ru-RU" dirty="0"/>
+        <p:spPr>
+          <a:xfrm>
+            <a:off x="457200" y="2393504"/>
+            <a:ext cx="8229600" cy="3845023"/>
+          </a:xfrm>
+        </p:spPr>
+        <p:txBody>
+          <a:bodyPr>
+            <a:normAutofit fontScale="85000" lnSpcReduction="20000"/>
+          </a:bodyPr>
+          <a:lstStyle/>
+          <a:p>
+            <a:r>
+              <a:rPr lang="uk-UA" dirty="0"/>
+              <a:t>На основі </a:t>
+            </a:r>
+            <a:r>
+              <a:rPr lang="en-US" dirty="0"/>
+              <a:t>ASP</a:t>
+            </a:r>
+            <a:r>
+              <a:rPr lang="ru-RU" dirty="0"/>
+              <a:t>.</a:t>
+            </a:r>
+            <a:r>
+              <a:rPr lang="en-US" dirty="0"/>
+              <a:t>NET MVC </a:t>
+            </a:r>
+            <a:r>
+              <a:rPr lang="ru-RU" dirty="0" err="1"/>
+              <a:t>було</a:t>
+            </a:r>
+            <a:r>
+              <a:rPr lang="ru-RU" dirty="0"/>
+              <a:t> </a:t>
+            </a:r>
+            <a:r>
+              <a:rPr lang="ru-RU" dirty="0" err="1"/>
+              <a:t>реалізовано</a:t>
+            </a:r>
+            <a:r>
+              <a:rPr lang="ru-RU" dirty="0"/>
+              <a:t> </a:t>
+            </a:r>
+            <a:r>
+              <a:rPr lang="ru-RU" dirty="0" err="1"/>
+              <a:t>застосунок</a:t>
+            </a:r>
+            <a:r>
+              <a:rPr lang="ru-RU" dirty="0"/>
+              <a:t> для </a:t>
+            </a:r>
+            <a:r>
+              <a:rPr lang="ru-RU" dirty="0" err="1"/>
+              <a:t>обміну</a:t>
+            </a:r>
+            <a:r>
+              <a:rPr lang="ru-RU" dirty="0"/>
+              <a:t> </a:t>
+            </a:r>
+            <a:r>
+              <a:rPr lang="ru-RU" dirty="0" err="1"/>
+              <a:t>повідомленняму</a:t>
+            </a:r>
+            <a:r>
+              <a:rPr lang="ru-RU" dirty="0"/>
+              <a:t> у </a:t>
+            </a:r>
+            <a:r>
+              <a:rPr lang="ru-RU" dirty="0" err="1"/>
+              <a:t>режимі</a:t>
+            </a:r>
+            <a:r>
+              <a:rPr lang="ru-RU" dirty="0"/>
+              <a:t> реального часу. Для </a:t>
+            </a:r>
+            <a:r>
+              <a:rPr lang="ru-RU" dirty="0" err="1"/>
+              <a:t>досягнення</a:t>
+            </a:r>
+            <a:r>
+              <a:rPr lang="ru-RU" dirty="0"/>
+              <a:t> </a:t>
+            </a:r>
+            <a:r>
+              <a:rPr lang="ru-RU" dirty="0" err="1"/>
+              <a:t>цих</a:t>
+            </a:r>
+            <a:r>
+              <a:rPr lang="ru-RU" dirty="0"/>
+              <a:t> </a:t>
+            </a:r>
+            <a:r>
+              <a:rPr lang="ru-RU" dirty="0" err="1"/>
+              <a:t>цілей</a:t>
+            </a:r>
+            <a:r>
+              <a:rPr lang="ru-RU" dirty="0"/>
+              <a:t> </a:t>
+            </a:r>
+            <a:r>
+              <a:rPr lang="ru-RU" dirty="0" err="1"/>
+              <a:t>було</a:t>
+            </a:r>
+            <a:r>
+              <a:rPr lang="ru-RU" dirty="0"/>
+              <a:t> </a:t>
+            </a:r>
+            <a:r>
+              <a:rPr lang="ru-RU" dirty="0" err="1"/>
+              <a:t>використано</a:t>
+            </a:r>
+            <a:r>
+              <a:rPr lang="ru-RU" dirty="0"/>
+              <a:t> </a:t>
+            </a:r>
+            <a:r>
+              <a:rPr lang="ru-RU" dirty="0" err="1"/>
+              <a:t>технологію</a:t>
+            </a:r>
+            <a:r>
+              <a:rPr lang="ru-RU" dirty="0"/>
+              <a:t> .</a:t>
+            </a:r>
+            <a:r>
+              <a:rPr lang="en-US" dirty="0"/>
+              <a:t>NET </a:t>
+            </a:r>
+            <a:r>
+              <a:rPr lang="uk-UA" dirty="0"/>
+              <a:t>для веб-</a:t>
+            </a:r>
+            <a:r>
+              <a:rPr lang="uk-UA" dirty="0" err="1"/>
+              <a:t>сокетів</a:t>
+            </a:r>
+            <a:r>
+              <a:rPr lang="uk-UA" dirty="0"/>
+              <a:t> </a:t>
+            </a:r>
+            <a:r>
+              <a:rPr lang="en-US" dirty="0" err="1"/>
+              <a:t>SignalR</a:t>
+            </a:r>
+            <a:r>
+              <a:rPr lang="ru-RU" dirty="0"/>
+              <a:t>. </a:t>
+            </a:r>
+            <a:r>
+              <a:rPr lang="uk-UA" dirty="0"/>
+              <a:t>Наявність більшості </a:t>
+            </a:r>
+            <a:r>
+              <a:rPr lang="uk-UA" dirty="0" err="1"/>
+              <a:t>основоного</a:t>
+            </a:r>
+            <a:r>
+              <a:rPr lang="uk-UA" dirty="0"/>
+              <a:t> функціоналу вже у готовому вигляді, в тому числі: реалізація технології веб-</a:t>
+            </a:r>
+            <a:r>
+              <a:rPr lang="uk-UA" dirty="0" err="1"/>
+              <a:t>сокетів</a:t>
+            </a:r>
+            <a:r>
+              <a:rPr lang="uk-UA" dirty="0"/>
+              <a:t>, фреймворк авторизації та аутентифікації користувачів – значно прискорює розробку </a:t>
+            </a:r>
+            <a:r>
+              <a:rPr lang="uk-UA" dirty="0" err="1"/>
+              <a:t>основоного</a:t>
+            </a:r>
+            <a:r>
+              <a:rPr lang="uk-UA" dirty="0"/>
+              <a:t> функціоналу, базового каркасу застосунку. </a:t>
+            </a:r>
+            <a:r>
+              <a:rPr lang="uk-UA" dirty="0" err="1"/>
+              <a:t>Задяки</a:t>
+            </a:r>
+            <a:r>
+              <a:rPr lang="uk-UA" dirty="0"/>
+              <a:t> наявності автоматизованої системи генерації таблиць у базі даних для збереження інформації про користувача, а також автоматичного </a:t>
+            </a:r>
+            <a:r>
+              <a:rPr lang="uk-UA" dirty="0" err="1"/>
+              <a:t>мапінгу</a:t>
+            </a:r>
+            <a:r>
+              <a:rPr lang="uk-UA" dirty="0"/>
+              <a:t> у моделі користувача можна не витрачати час на розробку функціоналу, що є поширеним серед різних застосунків, </a:t>
+            </a:r>
+            <a:r>
+              <a:rPr lang="uk-UA" dirty="0" err="1"/>
+              <a:t>тобо</a:t>
+            </a:r>
+            <a:r>
+              <a:rPr lang="uk-UA" dirty="0"/>
+              <a:t> можна використовувати уніфікований шаблон, що підходить більшості проектів.</a:t>
+            </a:r>
+            <a:endParaRPr lang="ru-UA" dirty="0"/>
+          </a:p>
+          <a:p>
+            <a:endParaRPr lang="ru-UA" dirty="0"/>
           </a:p>
         </p:txBody>
       </p:sp>
     </p:spTree>
     <p:extLst>
       <p:ext uri="{BB962C8B-B14F-4D97-AF65-F5344CB8AC3E}">
-        <p14:creationId xmlns:p14="http://schemas.microsoft.com/office/powerpoint/2010/main" val="3968867334"/>
+        <p14:creationId xmlns:p14="http://schemas.microsoft.com/office/powerpoint/2010/main" val="3043836728"/>
       </p:ext>
     </p:extLst>
   </p:cSld>
   <p:clrMapOvr>
     <a:masterClrMapping/>
   </p:clrMapOvr>
-  <p:timing>
-    <p:tnLst>
-      <p:par>
-        <p:cTn id="1" dur="indefinite" restart="never" nodeType="tmRoot"/>
-      </p:par>
-    </p:tnLst>
-  </p:timing>
 </p:sld>
 </file>
 
@@ -4596,6 +4990,26 @@
           <a:bodyPr/>
           <a:lstStyle/>
           <a:p>
+            <a:r>
+              <a:rPr lang="ru-RU" dirty="0" err="1"/>
+              <a:t>Архітектура</a:t>
+            </a:r>
+            <a:r>
+              <a:rPr lang="ru-RU" dirty="0"/>
+              <a:t> </a:t>
+            </a:r>
+            <a:r>
+              <a:rPr lang="ru-RU" dirty="0" err="1"/>
+              <a:t>застосунку</a:t>
+            </a:r>
+            <a:r>
+              <a:rPr lang="ru-RU" dirty="0"/>
+              <a:t> </a:t>
+            </a:r>
+            <a:r>
+              <a:rPr lang="ru-RU" dirty="0" err="1"/>
+              <a:t>Месенджер</a:t>
+            </a:r>
             <a:endParaRPr lang="ru-RU" dirty="0"/>
           </a:p>
         </p:txBody>
@@ -4639,13 +5053,6 @@
   <p:clrMapOvr>
     <a:masterClrMapping/>
   </p:clrMapOvr>
-  <p:timing>
-    <p:tnLst>
-      <p:par>
-        <p:cTn id="1" dur="indefinite" restart="never" nodeType="tmRoot"/>
-      </p:par>
-    </p:tnLst>
-  </p:timing>
 </p:sld>
 </file>
 

</xml_diff>